<commit_message>
Fix formatting in portfolio
</commit_message>
<xml_diff>
--- a/docs/diagrams/SuggestSequenceDiagram.pptx
+++ b/docs/diagrams/SuggestSequenceDiagram.pptx
@@ -109,7 +109,7 @@
   </p:defaultTextStyle>
   <p:extLst>
     <p:ext uri="{EFAFB233-063F-42B5-8137-9DF3F51BA10A}">
-      <p15:sldGuideLst xmlns="" xmlns:p15="http://schemas.microsoft.com/office/powerpoint/2012/main">
+      <p15:sldGuideLst xmlns:p15="http://schemas.microsoft.com/office/powerpoint/2012/main" xmlns="">
         <p15:guide id="1" orient="horz" pos="1488">
           <p15:clr>
             <a:srgbClr val="A4A3A4"/>
@@ -4370,8 +4370,8 @@
         </p:nvSpPr>
         <p:spPr>
           <a:xfrm>
-            <a:off x="1864343" y="1121510"/>
-            <a:ext cx="2223919" cy="215444"/>
+            <a:off x="1058002" y="950282"/>
+            <a:ext cx="2556281" cy="430887"/>
           </a:xfrm>
           <a:prstGeom prst="rect">
             <a:avLst/>
@@ -4396,12 +4396,27 @@
           </a:lstStyle>
           <a:p>
             <a:r>
-              <a:rPr lang="en-US" dirty="0" err="1"/>
+              <a:rPr lang="en-US" dirty="0" err="1" smtClean="0"/>
               <a:t>parseCommand</a:t>
             </a:r>
+            <a:endParaRPr lang="en-US" dirty="0" smtClean="0"/>
+          </a:p>
+          <a:p>
             <a:r>
               <a:rPr lang="en-US" dirty="0" smtClean="0"/>
-              <a:t>(“list y/1 s/1”)</a:t>
+              <a:t>(“</a:t>
+            </a:r>
+            <a:r>
+              <a:rPr lang="en-US" dirty="0" smtClean="0"/>
+              <a:t>sugges</a:t>
+            </a:r>
+            <a:r>
+              <a:rPr lang="en-US" dirty="0" smtClean="0"/>
+              <a:t>t </a:t>
+            </a:r>
+            <a:r>
+              <a:rPr lang="en-US" dirty="0" smtClean="0"/>
+              <a:t>y/1 s/1”)</a:t>
             </a:r>
             <a:endParaRPr lang="en-US" dirty="0"/>
           </a:p>
@@ -4850,7 +4865,7 @@
           <p:cNvPr id="66" name="Straight Arrow Connector 65">
             <a:extLst>
               <a:ext uri="{FF2B5EF4-FFF2-40B4-BE49-F238E27FC236}">
-                <a16:creationId xmlns="" xmlns:a16="http://schemas.microsoft.com/office/drawing/2014/main" id="{39916E2E-195A-4DC8-B025-B05FA87E6796}"/>
+                <a16:creationId xmlns:a16="http://schemas.microsoft.com/office/drawing/2014/main" xmlns="" id="{39916E2E-195A-4DC8-B025-B05FA87E6796}"/>
               </a:ext>
             </a:extLst>
           </p:cNvPr>
@@ -4894,7 +4909,7 @@
           <p:cNvPr id="67" name="Straight Arrow Connector 66">
             <a:extLst>
               <a:ext uri="{FF2B5EF4-FFF2-40B4-BE49-F238E27FC236}">
-                <a16:creationId xmlns="" xmlns:a16="http://schemas.microsoft.com/office/drawing/2014/main" id="{D881596E-177C-4FDC-8E60-CAB90B3D5FAB}"/>
+                <a16:creationId xmlns:a16="http://schemas.microsoft.com/office/drawing/2014/main" xmlns="" id="{D881596E-177C-4FDC-8E60-CAB90B3D5FAB}"/>
               </a:ext>
             </a:extLst>
           </p:cNvPr>
@@ -4938,7 +4953,7 @@
           <p:cNvPr id="69" name="Straight Arrow Connector 68">
             <a:extLst>
               <a:ext uri="{FF2B5EF4-FFF2-40B4-BE49-F238E27FC236}">
-                <a16:creationId xmlns="" xmlns:a16="http://schemas.microsoft.com/office/drawing/2014/main" id="{7C9F21BC-13A9-471F-825A-2621FD36355F}"/>
+                <a16:creationId xmlns:a16="http://schemas.microsoft.com/office/drawing/2014/main" xmlns="" id="{7C9F21BC-13A9-471F-825A-2621FD36355F}"/>
               </a:ext>
             </a:extLst>
           </p:cNvPr>
@@ -4984,7 +4999,7 @@
           <p:cNvPr id="89" name="Straight Connector 88">
             <a:extLst>
               <a:ext uri="{FF2B5EF4-FFF2-40B4-BE49-F238E27FC236}">
-                <a16:creationId xmlns="" xmlns:a16="http://schemas.microsoft.com/office/drawing/2014/main" id="{E4E1C8CA-49DF-45D8-80A5-D5C8282EE927}"/>
+                <a16:creationId xmlns:a16="http://schemas.microsoft.com/office/drawing/2014/main" xmlns="" id="{E4E1C8CA-49DF-45D8-80A5-D5C8282EE927}"/>
               </a:ext>
             </a:extLst>
           </p:cNvPr>
@@ -5146,7 +5161,7 @@
           <p:cNvPr id="60" name="Straight Arrow Connector 59">
             <a:extLst>
               <a:ext uri="{FF2B5EF4-FFF2-40B4-BE49-F238E27FC236}">
-                <a16:creationId xmlns="" xmlns:a16="http://schemas.microsoft.com/office/drawing/2014/main" id="{7C9F21BC-13A9-471F-825A-2621FD36355F}"/>
+                <a16:creationId xmlns:a16="http://schemas.microsoft.com/office/drawing/2014/main" xmlns="" id="{7C9F21BC-13A9-471F-825A-2621FD36355F}"/>
               </a:ext>
             </a:extLst>
           </p:cNvPr>
@@ -5192,7 +5207,7 @@
           <p:cNvPr id="63" name="Straight Arrow Connector 62">
             <a:extLst>
               <a:ext uri="{FF2B5EF4-FFF2-40B4-BE49-F238E27FC236}">
-                <a16:creationId xmlns="" xmlns:a16="http://schemas.microsoft.com/office/drawing/2014/main" id="{7C9F21BC-13A9-471F-825A-2621FD36355F}"/>
+                <a16:creationId xmlns:a16="http://schemas.microsoft.com/office/drawing/2014/main" xmlns="" id="{7C9F21BC-13A9-471F-825A-2621FD36355F}"/>
               </a:ext>
             </a:extLst>
           </p:cNvPr>
@@ -5445,7 +5460,7 @@
           <p:cNvPr id="59" name="Straight Arrow Connector 58">
             <a:extLst>
               <a:ext uri="{FF2B5EF4-FFF2-40B4-BE49-F238E27FC236}">
-                <a16:creationId xmlns="" xmlns:a16="http://schemas.microsoft.com/office/drawing/2014/main" id="{D881596E-177C-4FDC-8E60-CAB90B3D5FAB}"/>
+                <a16:creationId xmlns:a16="http://schemas.microsoft.com/office/drawing/2014/main" xmlns="" id="{D881596E-177C-4FDC-8E60-CAB90B3D5FAB}"/>
               </a:ext>
             </a:extLst>
           </p:cNvPr>
@@ -5756,7 +5771,7 @@
           <p:cNvPr id="78" name="Straight Arrow Connector 77">
             <a:extLst>
               <a:ext uri="{FF2B5EF4-FFF2-40B4-BE49-F238E27FC236}">
-                <a16:creationId xmlns="" xmlns:a16="http://schemas.microsoft.com/office/drawing/2014/main" id="{7C9F21BC-13A9-471F-825A-2621FD36355F}"/>
+                <a16:creationId xmlns:a16="http://schemas.microsoft.com/office/drawing/2014/main" xmlns="" id="{7C9F21BC-13A9-471F-825A-2621FD36355F}"/>
               </a:ext>
             </a:extLst>
           </p:cNvPr>
@@ -6031,7 +6046,7 @@
           <p:cNvPr id="100" name="Straight Arrow Connector 99">
             <a:extLst>
               <a:ext uri="{FF2B5EF4-FFF2-40B4-BE49-F238E27FC236}">
-                <a16:creationId xmlns="" xmlns:a16="http://schemas.microsoft.com/office/drawing/2014/main" id="{7C9F21BC-13A9-471F-825A-2621FD36355F}"/>
+                <a16:creationId xmlns:a16="http://schemas.microsoft.com/office/drawing/2014/main" xmlns="" id="{7C9F21BC-13A9-471F-825A-2621FD36355F}"/>
               </a:ext>
             </a:extLst>
           </p:cNvPr>

</xml_diff>